<commit_message>
Add quiz sequence diagram
</commit_message>
<xml_diff>
--- a/docs/diagrams/QuizSequenceDiagram.pptx
+++ b/docs/diagrams/QuizSequenceDiagram.pptx
@@ -208,7 +208,7 @@
           <a:p>
             <a:fld id="{F5CC4B3F-88C1-4FFA-B1B6-F41C21DC6924}" type="datetimeFigureOut">
               <a:rPr lang="en-US" smtClean="0"/>
-              <a:t>4/14/19</a:t>
+              <a:t>4/15/19</a:t>
             </a:fld>
             <a:endParaRPr lang="en-US"/>
           </a:p>
@@ -654,7 +654,7 @@
           <a:p>
             <a:fld id="{78C97017-6FC3-485B-9764-EAC9E56C1D49}" type="datetimeFigureOut">
               <a:rPr lang="en-US" smtClean="0"/>
-              <a:t>4/14/19</a:t>
+              <a:t>4/15/19</a:t>
             </a:fld>
             <a:endParaRPr lang="en-US"/>
           </a:p>
@@ -822,7 +822,7 @@
           <a:p>
             <a:fld id="{78C97017-6FC3-485B-9764-EAC9E56C1D49}" type="datetimeFigureOut">
               <a:rPr lang="en-US" smtClean="0"/>
-              <a:t>4/14/19</a:t>
+              <a:t>4/15/19</a:t>
             </a:fld>
             <a:endParaRPr lang="en-US"/>
           </a:p>
@@ -1000,7 +1000,7 @@
           <a:p>
             <a:fld id="{78C97017-6FC3-485B-9764-EAC9E56C1D49}" type="datetimeFigureOut">
               <a:rPr lang="en-US" smtClean="0"/>
-              <a:t>4/14/19</a:t>
+              <a:t>4/15/19</a:t>
             </a:fld>
             <a:endParaRPr lang="en-US"/>
           </a:p>
@@ -1168,7 +1168,7 @@
           <a:p>
             <a:fld id="{78C97017-6FC3-485B-9764-EAC9E56C1D49}" type="datetimeFigureOut">
               <a:rPr lang="en-US" smtClean="0"/>
-              <a:t>4/14/19</a:t>
+              <a:t>4/15/19</a:t>
             </a:fld>
             <a:endParaRPr lang="en-US"/>
           </a:p>
@@ -1413,7 +1413,7 @@
           <a:p>
             <a:fld id="{78C97017-6FC3-485B-9764-EAC9E56C1D49}" type="datetimeFigureOut">
               <a:rPr lang="en-US" smtClean="0"/>
-              <a:t>4/14/19</a:t>
+              <a:t>4/15/19</a:t>
             </a:fld>
             <a:endParaRPr lang="en-US"/>
           </a:p>
@@ -1698,7 +1698,7 @@
           <a:p>
             <a:fld id="{78C97017-6FC3-485B-9764-EAC9E56C1D49}" type="datetimeFigureOut">
               <a:rPr lang="en-US" smtClean="0"/>
-              <a:t>4/14/19</a:t>
+              <a:t>4/15/19</a:t>
             </a:fld>
             <a:endParaRPr lang="en-US"/>
           </a:p>
@@ -2117,7 +2117,7 @@
           <a:p>
             <a:fld id="{78C97017-6FC3-485B-9764-EAC9E56C1D49}" type="datetimeFigureOut">
               <a:rPr lang="en-US" smtClean="0"/>
-              <a:t>4/14/19</a:t>
+              <a:t>4/15/19</a:t>
             </a:fld>
             <a:endParaRPr lang="en-US"/>
           </a:p>
@@ -2234,7 +2234,7 @@
           <a:p>
             <a:fld id="{78C97017-6FC3-485B-9764-EAC9E56C1D49}" type="datetimeFigureOut">
               <a:rPr lang="en-US" smtClean="0"/>
-              <a:t>4/14/19</a:t>
+              <a:t>4/15/19</a:t>
             </a:fld>
             <a:endParaRPr lang="en-US"/>
           </a:p>
@@ -2329,7 +2329,7 @@
           <a:p>
             <a:fld id="{78C97017-6FC3-485B-9764-EAC9E56C1D49}" type="datetimeFigureOut">
               <a:rPr lang="en-US" smtClean="0"/>
-              <a:t>4/14/19</a:t>
+              <a:t>4/15/19</a:t>
             </a:fld>
             <a:endParaRPr lang="en-US"/>
           </a:p>
@@ -2604,7 +2604,7 @@
           <a:p>
             <a:fld id="{78C97017-6FC3-485B-9764-EAC9E56C1D49}" type="datetimeFigureOut">
               <a:rPr lang="en-US" smtClean="0"/>
-              <a:t>4/14/19</a:t>
+              <a:t>4/15/19</a:t>
             </a:fld>
             <a:endParaRPr lang="en-US"/>
           </a:p>
@@ -2856,7 +2856,7 @@
           <a:p>
             <a:fld id="{78C97017-6FC3-485B-9764-EAC9E56C1D49}" type="datetimeFigureOut">
               <a:rPr lang="en-US" smtClean="0"/>
-              <a:t>4/14/19</a:t>
+              <a:t>4/15/19</a:t>
             </a:fld>
             <a:endParaRPr lang="en-US"/>
           </a:p>
@@ -3067,7 +3067,7 @@
           <a:p>
             <a:fld id="{78C97017-6FC3-485B-9764-EAC9E56C1D49}" type="datetimeFigureOut">
               <a:rPr lang="en-US" smtClean="0"/>
-              <a:t>4/14/19</a:t>
+              <a:t>4/15/19</a:t>
             </a:fld>
             <a:endParaRPr lang="en-US"/>
           </a:p>
@@ -3450,12 +3450,12 @@
         </p:nvSpPr>
         <p:spPr>
           <a:xfrm>
-            <a:off x="6459374" y="118895"/>
-            <a:ext cx="3903825" cy="4400926"/>
+            <a:off x="4811713" y="193128"/>
+            <a:ext cx="1250180" cy="4340772"/>
           </a:xfrm>
           <a:prstGeom prst="roundRect">
             <a:avLst>
-              <a:gd name="adj" fmla="val 3484"/>
+              <a:gd name="adj" fmla="val 11183"/>
             </a:avLst>
           </a:prstGeom>
           <a:solidFill>
@@ -3511,8 +3511,8 @@
         </p:nvSpPr>
         <p:spPr>
           <a:xfrm>
-            <a:off x="228600" y="190500"/>
-            <a:ext cx="6113303" cy="4343400"/>
+            <a:off x="304963" y="190396"/>
+            <a:ext cx="4374238" cy="4343400"/>
           </a:xfrm>
           <a:prstGeom prst="roundRect">
             <a:avLst>
@@ -3572,7 +3572,7 @@
         </p:nvSpPr>
         <p:spPr>
           <a:xfrm>
-            <a:off x="883145" y="543946"/>
+            <a:off x="502145" y="543946"/>
             <a:ext cx="1455629" cy="346760"/>
           </a:xfrm>
           <a:prstGeom prst="rect">
@@ -3641,7 +3641,7 @@
         </p:nvCxnSpPr>
         <p:spPr>
           <a:xfrm>
-            <a:off x="1610959" y="907617"/>
+            <a:off x="1229959" y="907617"/>
             <a:ext cx="0" cy="3481399"/>
           </a:xfrm>
           <a:prstGeom prst="line">
@@ -3678,7 +3678,7 @@
         </p:nvSpPr>
         <p:spPr>
           <a:xfrm>
-            <a:off x="1538951" y="1258311"/>
+            <a:off x="1157951" y="1258311"/>
             <a:ext cx="152400" cy="2932689"/>
           </a:xfrm>
           <a:prstGeom prst="rect">
@@ -3725,8 +3725,8 @@
         </p:nvSpPr>
         <p:spPr>
           <a:xfrm>
-            <a:off x="3311606" y="423209"/>
-            <a:ext cx="1455623" cy="467684"/>
+            <a:off x="2133600" y="552286"/>
+            <a:ext cx="1455623" cy="438314"/>
           </a:xfrm>
           <a:prstGeom prst="rect">
             <a:avLst/>
@@ -3805,13 +3805,14 @@
           <p:cNvPr id="17" name="Straight Connector 16"/>
           <p:cNvCxnSpPr>
             <a:cxnSpLocks/>
+            <a:stCxn id="16" idx="2"/>
           </p:cNvCxnSpPr>
           <p:nvPr/>
         </p:nvCxnSpPr>
         <p:spPr>
           <a:xfrm>
-            <a:off x="4050587" y="907617"/>
-            <a:ext cx="0" cy="1482984"/>
+            <a:off x="2861412" y="990600"/>
+            <a:ext cx="0" cy="914400"/>
           </a:xfrm>
           <a:prstGeom prst="line">
             <a:avLst/>
@@ -3847,8 +3848,8 @@
         </p:nvSpPr>
         <p:spPr>
           <a:xfrm>
-            <a:off x="3978580" y="1365810"/>
-            <a:ext cx="154408" cy="767790"/>
+            <a:off x="2781246" y="1370306"/>
+            <a:ext cx="154408" cy="421239"/>
           </a:xfrm>
           <a:prstGeom prst="rect">
             <a:avLst/>
@@ -3896,14 +3897,13 @@
           <p:cNvCxnSpPr>
             <a:cxnSpLocks/>
             <a:stCxn id="21" idx="0"/>
-            <a:endCxn id="4" idx="0"/>
           </p:cNvCxnSpPr>
           <p:nvPr/>
         </p:nvCxnSpPr>
         <p:spPr>
           <a:xfrm>
-            <a:off x="5602082" y="1613633"/>
-            <a:ext cx="0" cy="2644578"/>
+            <a:off x="3886200" y="1591737"/>
+            <a:ext cx="0" cy="2599263"/>
           </a:xfrm>
           <a:prstGeom prst="line">
             <a:avLst/>
@@ -3939,8 +3939,8 @@
         </p:nvSpPr>
         <p:spPr>
           <a:xfrm>
-            <a:off x="5525882" y="1613633"/>
-            <a:ext cx="152400" cy="276003"/>
+            <a:off x="3810000" y="1591737"/>
+            <a:ext cx="152400" cy="160864"/>
           </a:xfrm>
           <a:prstGeom prst="rect">
             <a:avLst/>
@@ -3988,8 +3988,8 @@
         </p:nvCxnSpPr>
         <p:spPr>
           <a:xfrm>
-            <a:off x="76200" y="1261999"/>
-            <a:ext cx="1462751" cy="0"/>
+            <a:off x="172124" y="1261999"/>
+            <a:ext cx="985827" cy="0"/>
           </a:xfrm>
           <a:prstGeom prst="straightConnector1">
             <a:avLst/>
@@ -4024,8 +4024,8 @@
         </p:nvSpPr>
         <p:spPr>
           <a:xfrm>
-            <a:off x="38100" y="990600"/>
-            <a:ext cx="1424846" cy="215444"/>
+            <a:off x="152400" y="1034534"/>
+            <a:ext cx="1047075" cy="169277"/>
           </a:xfrm>
           <a:prstGeom prst="rect">
             <a:avLst/>
@@ -4040,7 +4040,7 @@
           <a:p>
             <a:pPr algn="r"/>
             <a:r>
-              <a:rPr lang="en-US" sz="1400" dirty="0">
+              <a:rPr lang="en-US" sz="1100" dirty="0">
                 <a:solidFill>
                   <a:srgbClr val="0070C0"/>
                 </a:solidFill>
@@ -4053,13 +4053,15 @@
       <p:cxnSp>
         <p:nvCxnSpPr>
           <p:cNvPr id="28" name="Straight Arrow Connector 27"/>
-          <p:cNvCxnSpPr/>
+          <p:cNvCxnSpPr>
+            <a:cxnSpLocks/>
+          </p:cNvCxnSpPr>
           <p:nvPr/>
         </p:nvCxnSpPr>
         <p:spPr>
-          <a:xfrm flipV="1">
-            <a:off x="4135972" y="1512340"/>
-            <a:ext cx="922392" cy="1"/>
+          <a:xfrm>
+            <a:off x="2935654" y="1446858"/>
+            <a:ext cx="381000" cy="0"/>
           </a:xfrm>
           <a:prstGeom prst="straightConnector1">
             <a:avLst/>
@@ -4094,7 +4096,7 @@
         </p:nvSpPr>
         <p:spPr>
           <a:xfrm>
-            <a:off x="3243421" y="2484071"/>
+            <a:off x="2192797" y="1994356"/>
             <a:ext cx="855809" cy="215444"/>
           </a:xfrm>
           <a:prstGeom prst="rect">
@@ -4129,13 +4131,15 @@
       <p:cxnSp>
         <p:nvCxnSpPr>
           <p:cNvPr id="34" name="Straight Arrow Connector 33"/>
-          <p:cNvCxnSpPr/>
+          <p:cNvCxnSpPr>
+            <a:cxnSpLocks/>
+          </p:cNvCxnSpPr>
           <p:nvPr/>
         </p:nvCxnSpPr>
         <p:spPr>
           <a:xfrm>
-            <a:off x="4109108" y="1878232"/>
-            <a:ext cx="1492974" cy="0"/>
+            <a:off x="2935654" y="1752601"/>
+            <a:ext cx="914400" cy="0"/>
           </a:xfrm>
           <a:prstGeom prst="straightConnector1">
             <a:avLst/>
@@ -4174,8 +4178,8 @@
         </p:nvCxnSpPr>
         <p:spPr>
           <a:xfrm>
-            <a:off x="1691351" y="2133600"/>
-            <a:ext cx="2348067" cy="0"/>
+            <a:off x="1310351" y="1782173"/>
+            <a:ext cx="1435139" cy="0"/>
           </a:xfrm>
           <a:prstGeom prst="straightConnector1">
             <a:avLst/>
@@ -4207,13 +4211,15 @@
       <p:cxnSp>
         <p:nvCxnSpPr>
           <p:cNvPr id="37" name="Straight Arrow Connector 36"/>
-          <p:cNvCxnSpPr/>
+          <p:cNvCxnSpPr>
+            <a:cxnSpLocks/>
+          </p:cNvCxnSpPr>
           <p:nvPr/>
         </p:nvCxnSpPr>
         <p:spPr>
           <a:xfrm>
-            <a:off x="380999" y="4191000"/>
-            <a:ext cx="1196051" cy="0"/>
+            <a:off x="172124" y="4191000"/>
+            <a:ext cx="1023926" cy="0"/>
           </a:xfrm>
           <a:prstGeom prst="straightConnector1">
             <a:avLst/>
@@ -4250,8 +4256,8 @@
         </p:nvSpPr>
         <p:spPr>
           <a:xfrm>
-            <a:off x="5526488" y="2731313"/>
-            <a:ext cx="161322" cy="1307285"/>
+            <a:off x="3804886" y="2217623"/>
+            <a:ext cx="161322" cy="1836000"/>
           </a:xfrm>
           <a:prstGeom prst="rect">
             <a:avLst/>
@@ -4297,8 +4303,8 @@
         </p:nvSpPr>
         <p:spPr>
           <a:xfrm>
-            <a:off x="5651548" y="2748246"/>
-            <a:ext cx="1298078" cy="184666"/>
+            <a:off x="4038600" y="2087551"/>
+            <a:ext cx="1414130" cy="169277"/>
           </a:xfrm>
           <a:prstGeom prst="rect">
             <a:avLst/>
@@ -4322,33 +4328,28 @@
             </a:lvl1pPr>
           </a:lstStyle>
           <a:p>
-            <a:r>
-              <a:rPr lang="en-US" sz="1200" dirty="0" err="1">
+            <a:pPr algn="l"/>
+            <a:r>
+              <a:rPr lang="en-US" sz="1100" dirty="0" err="1">
                 <a:solidFill>
                   <a:schemeClr val="accent4">
                     <a:lumMod val="75000"/>
                   </a:schemeClr>
                 </a:solidFill>
               </a:rPr>
-              <a:t>undo</a:t>
-            </a:r>
-            <a:r>
-              <a:rPr lang="en-US" sz="1200" dirty="0" err="1">
+              <a:t>setQuizFlashcards</a:t>
+            </a:r>
+            <a:r>
+              <a:rPr lang="en-US" sz="1100" dirty="0">
                 <a:solidFill>
-                  <a:srgbClr val="7030A0"/>
-                </a:solidFill>
-              </a:rPr>
-              <a:t>AddressBook</a:t>
-            </a:r>
-            <a:r>
-              <a:rPr lang="en-US" sz="1200" dirty="0">
-                <a:solidFill>
-                  <a:srgbClr val="7030A0"/>
+                  <a:schemeClr val="accent4">
+                    <a:lumMod val="75000"/>
+                  </a:schemeClr>
                 </a:solidFill>
               </a:rPr>
               <a:t>()</a:t>
             </a:r>
-            <a:endParaRPr lang="en-US" sz="1200" dirty="0"/>
+            <a:endParaRPr lang="en-US" sz="1100" dirty="0"/>
           </a:p>
         </p:txBody>
       </p:sp>
@@ -4360,8 +4361,8 @@
         </p:nvSpPr>
         <p:spPr>
           <a:xfrm>
-            <a:off x="1885189" y="1106150"/>
-            <a:ext cx="1899551" cy="215444"/>
+            <a:off x="1447800" y="1143000"/>
+            <a:ext cx="1564050" cy="161583"/>
           </a:xfrm>
           <a:prstGeom prst="rect">
             <a:avLst/>
@@ -4385,12 +4386,13 @@
             </a:lvl1pPr>
           </a:lstStyle>
           <a:p>
-            <a:r>
-              <a:rPr lang="en-US" dirty="0" err="1"/>
+            <a:pPr algn="l"/>
+            <a:r>
+              <a:rPr lang="en-US" sz="1050" dirty="0" err="1"/>
               <a:t>parseCommand</a:t>
             </a:r>
             <a:r>
-              <a:rPr lang="en-US" dirty="0"/>
+              <a:rPr lang="en-US" sz="1050" dirty="0"/>
               <a:t>(“quiz”)</a:t>
             </a:r>
           </a:p>
@@ -4404,7 +4406,7 @@
         </p:nvSpPr>
         <p:spPr>
           <a:xfrm>
-            <a:off x="3272755" y="3791076"/>
+            <a:off x="2336621" y="3798984"/>
             <a:ext cx="621216" cy="215444"/>
           </a:xfrm>
           <a:prstGeom prst="rect">
@@ -4444,7 +4446,7 @@
         </p:nvSpPr>
         <p:spPr>
           <a:xfrm>
-            <a:off x="645270" y="3945901"/>
+            <a:off x="152400" y="3945901"/>
             <a:ext cx="762000" cy="215444"/>
           </a:xfrm>
           <a:prstGeom prst="rect">
@@ -4478,127 +4480,13 @@
       </p:sp>
       <p:sp>
         <p:nvSpPr>
-          <p:cNvPr id="84" name="Rectangle 62"/>
-          <p:cNvSpPr/>
-          <p:nvPr/>
-        </p:nvSpPr>
-        <p:spPr>
-          <a:xfrm>
-            <a:off x="7497155" y="2568606"/>
-            <a:ext cx="2181777" cy="335427"/>
-          </a:xfrm>
-          <a:prstGeom prst="rect">
-            <a:avLst/>
-          </a:prstGeom>
-          <a:solidFill>
-            <a:srgbClr val="7030A0"/>
-          </a:solidFill>
-          <a:ln w="19050">
-            <a:solidFill>
-              <a:srgbClr val="7030A0"/>
-            </a:solidFill>
-          </a:ln>
-          <a:effectLst/>
-        </p:spPr>
-        <p:style>
-          <a:lnRef idx="1">
-            <a:schemeClr val="accent2"/>
-          </a:lnRef>
-          <a:fillRef idx="2">
-            <a:schemeClr val="accent2"/>
-          </a:fillRef>
-          <a:effectRef idx="1">
-            <a:schemeClr val="accent2"/>
-          </a:effectRef>
-          <a:fontRef idx="minor">
-            <a:schemeClr val="dk1"/>
-          </a:fontRef>
-        </p:style>
-        <p:txBody>
-          <a:bodyPr rtlCol="0" anchor="ctr"/>
-          <a:lstStyle/>
-          <a:p>
-            <a:pPr algn="ctr"/>
-            <a:r>
-              <a:rPr lang="en-US" sz="1600" dirty="0">
-                <a:solidFill>
-                  <a:schemeClr val="bg1"/>
-                </a:solidFill>
-              </a:rPr>
-              <a:t>:</a:t>
-            </a:r>
-            <a:r>
-              <a:rPr lang="en-US" sz="1600" dirty="0" err="1">
-                <a:solidFill>
-                  <a:schemeClr val="bg1"/>
-                </a:solidFill>
-              </a:rPr>
-              <a:t>VersionedAddressBook</a:t>
-            </a:r>
-            <a:endParaRPr lang="en-SG" sz="1600" dirty="0">
-              <a:solidFill>
-                <a:schemeClr val="bg1"/>
-              </a:solidFill>
-            </a:endParaRPr>
-          </a:p>
-        </p:txBody>
-      </p:sp>
-      <p:sp>
-        <p:nvSpPr>
-          <p:cNvPr id="86" name="Rectangle 85"/>
-          <p:cNvSpPr/>
-          <p:nvPr/>
-        </p:nvSpPr>
-        <p:spPr>
-          <a:xfrm>
-            <a:off x="8514207" y="3182840"/>
-            <a:ext cx="129933" cy="398562"/>
-          </a:xfrm>
-          <a:prstGeom prst="rect">
-            <a:avLst/>
-          </a:prstGeom>
-          <a:solidFill>
-            <a:srgbClr val="7030A0"/>
-          </a:solidFill>
-          <a:ln>
-            <a:solidFill>
-              <a:srgbClr val="7030A0"/>
-            </a:solidFill>
-          </a:ln>
-          <a:effectLst/>
-        </p:spPr>
-        <p:style>
-          <a:lnRef idx="1">
-            <a:schemeClr val="accent3"/>
-          </a:lnRef>
-          <a:fillRef idx="2">
-            <a:schemeClr val="accent3"/>
-          </a:fillRef>
-          <a:effectRef idx="1">
-            <a:schemeClr val="accent3"/>
-          </a:effectRef>
-          <a:fontRef idx="minor">
-            <a:schemeClr val="dk1"/>
-          </a:fontRef>
-        </p:style>
-        <p:txBody>
-          <a:bodyPr rtlCol="0" anchor="ctr"/>
-          <a:lstStyle/>
-          <a:p>
-            <a:pPr algn="ctr"/>
-            <a:endParaRPr lang="en-SG" sz="1400"/>
-          </a:p>
-        </p:txBody>
-      </p:sp>
-      <p:sp>
-        <p:nvSpPr>
           <p:cNvPr id="93" name="TextBox 92"/>
           <p:cNvSpPr txBox="1"/>
           <p:nvPr/>
         </p:nvSpPr>
         <p:spPr>
           <a:xfrm>
-            <a:off x="2724792" y="1905793"/>
+            <a:off x="1981200" y="1559972"/>
             <a:ext cx="220343" cy="215444"/>
           </a:xfrm>
           <a:prstGeom prst="rect">
@@ -4638,7 +4526,7 @@
         </p:nvSpPr>
         <p:spPr>
           <a:xfrm>
-            <a:off x="6549765" y="2362200"/>
+            <a:off x="5029200" y="1676400"/>
             <a:ext cx="841636" cy="300180"/>
           </a:xfrm>
           <a:prstGeom prst="rect">
@@ -4679,7 +4567,7 @@
                   <a:schemeClr val="bg1"/>
                 </a:solidFill>
               </a:rPr>
-              <a:t>: Model</a:t>
+              <a:t>:Model</a:t>
             </a:r>
             <a:endParaRPr lang="en-SG" sz="1600" dirty="0">
               <a:solidFill>
@@ -4698,9 +4586,9 @@
           <p:nvPr/>
         </p:nvCxnSpPr>
         <p:spPr>
-          <a:xfrm flipH="1">
-            <a:off x="6986491" y="2653306"/>
-            <a:ext cx="3959" cy="1735710"/>
+          <a:xfrm>
+            <a:off x="5442452" y="1994356"/>
+            <a:ext cx="1" cy="1896021"/>
           </a:xfrm>
           <a:prstGeom prst="line">
             <a:avLst/>
@@ -4736,8 +4624,8 @@
         </p:nvSpPr>
         <p:spPr>
           <a:xfrm>
-            <a:off x="6887527" y="2958106"/>
-            <a:ext cx="168896" cy="775693"/>
+            <a:off x="5359984" y="2287279"/>
+            <a:ext cx="168896" cy="283599"/>
           </a:xfrm>
           <a:prstGeom prst="rect">
             <a:avLst/>
@@ -4785,8 +4673,8 @@
         </p:nvCxnSpPr>
         <p:spPr>
           <a:xfrm>
-            <a:off x="5685755" y="2975344"/>
-            <a:ext cx="1210345" cy="0"/>
+            <a:off x="3976777" y="2285007"/>
+            <a:ext cx="1383207" cy="0"/>
           </a:xfrm>
           <a:prstGeom prst="straightConnector1">
             <a:avLst/>
@@ -4821,7 +4709,7 @@
         </p:nvSpPr>
         <p:spPr>
           <a:xfrm>
-            <a:off x="5472880" y="4258211"/>
+            <a:off x="3756345" y="4144834"/>
             <a:ext cx="258404" cy="261610"/>
           </a:xfrm>
           <a:prstGeom prst="rect">
@@ -4838,7 +4726,7 @@
             <a:r>
               <a:rPr lang="en-SG" sz="1100" dirty="0">
                 <a:solidFill>
-                  <a:srgbClr val="002060"/>
+                  <a:schemeClr val="accent1"/>
                 </a:solidFill>
               </a:rPr>
               <a:t>X</a:t>
@@ -4854,8 +4742,8 @@
         </p:nvSpPr>
         <p:spPr>
           <a:xfrm>
-            <a:off x="5035976" y="1260268"/>
-            <a:ext cx="1093635" cy="461538"/>
+            <a:off x="3325965" y="1178958"/>
+            <a:ext cx="1093635" cy="421242"/>
           </a:xfrm>
           <a:prstGeom prst="rect">
             <a:avLst/>
@@ -4890,7 +4778,7 @@
           <a:p>
             <a:pPr algn="ctr"/>
             <a:r>
-              <a:rPr lang="en-US" sz="1600" dirty="0" err="1">
+              <a:rPr lang="en-US" sz="1400" dirty="0" err="1">
                 <a:solidFill>
                   <a:schemeClr val="bg1"/>
                 </a:solidFill>
@@ -4898,21 +4786,21 @@
               <a:t>qc:Quiz</a:t>
             </a:r>
             <a:br>
-              <a:rPr lang="en-US" sz="1600" dirty="0">
+              <a:rPr lang="en-US" sz="1400" dirty="0">
                 <a:solidFill>
                   <a:schemeClr val="bg1"/>
                 </a:solidFill>
               </a:rPr>
             </a:br>
             <a:r>
-              <a:rPr lang="en-US" sz="1600" dirty="0">
+              <a:rPr lang="en-US" sz="1400" dirty="0">
                 <a:solidFill>
                   <a:schemeClr val="bg1"/>
                 </a:solidFill>
               </a:rPr>
               <a:t>Command</a:t>
             </a:r>
-            <a:endParaRPr lang="en-SG" sz="1600" dirty="0">
+            <a:endParaRPr lang="en-SG" sz="1400" dirty="0">
               <a:solidFill>
                 <a:schemeClr val="bg1"/>
               </a:solidFill>
@@ -4936,8 +4824,8 @@
         </p:nvCxnSpPr>
         <p:spPr>
           <a:xfrm>
-            <a:off x="1691351" y="2731314"/>
-            <a:ext cx="3832164" cy="1"/>
+            <a:off x="1310351" y="2209800"/>
+            <a:ext cx="2494535" cy="0"/>
           </a:xfrm>
           <a:prstGeom prst="straightConnector1">
             <a:avLst/>
@@ -4980,8 +4868,8 @@
         </p:nvCxnSpPr>
         <p:spPr>
           <a:xfrm>
-            <a:off x="1708245" y="1363918"/>
-            <a:ext cx="2256705" cy="1"/>
+            <a:off x="1327245" y="1363918"/>
+            <a:ext cx="1454001" cy="0"/>
           </a:xfrm>
           <a:prstGeom prst="straightConnector1">
             <a:avLst/>
@@ -5024,8 +4912,8 @@
         </p:nvCxnSpPr>
         <p:spPr>
           <a:xfrm>
-            <a:off x="1691998" y="4036462"/>
-            <a:ext cx="3831517" cy="0"/>
+            <a:off x="1310351" y="4053623"/>
+            <a:ext cx="2575196" cy="0"/>
           </a:xfrm>
           <a:prstGeom prst="straightConnector1">
             <a:avLst/>
@@ -5033,306 +4921,6 @@
           <a:ln w="19050">
             <a:solidFill>
               <a:srgbClr val="0070C0"/>
-            </a:solidFill>
-            <a:prstDash val="sysDash"/>
-            <a:headEnd type="arrow" w="med" len="med"/>
-            <a:tailEnd type="none" w="med" len="med"/>
-          </a:ln>
-        </p:spPr>
-        <p:style>
-          <a:lnRef idx="1">
-            <a:schemeClr val="accent1"/>
-          </a:lnRef>
-          <a:fillRef idx="0">
-            <a:schemeClr val="accent1"/>
-          </a:fillRef>
-          <a:effectRef idx="0">
-            <a:schemeClr val="accent1"/>
-          </a:effectRef>
-          <a:fontRef idx="minor">
-            <a:schemeClr val="tx1"/>
-          </a:fontRef>
-        </p:style>
-      </p:cxnSp>
-      <p:sp>
-        <p:nvSpPr>
-          <p:cNvPr id="88" name="TextBox 87">
-            <a:extLst>
-              <a:ext uri="{FF2B5EF4-FFF2-40B4-BE49-F238E27FC236}">
-                <a16:creationId xmlns:a16="http://schemas.microsoft.com/office/drawing/2014/main" id="{B85C6184-7378-4E89-A338-72B1E5056F4F}"/>
-              </a:ext>
-            </a:extLst>
-          </p:cNvPr>
-          <p:cNvSpPr txBox="1"/>
-          <p:nvPr/>
-        </p:nvSpPr>
-        <p:spPr>
-          <a:xfrm>
-            <a:off x="8769530" y="3267337"/>
-            <a:ext cx="2120786" cy="184666"/>
-          </a:xfrm>
-          <a:prstGeom prst="rect">
-            <a:avLst/>
-          </a:prstGeom>
-          <a:noFill/>
-        </p:spPr>
-        <p:txBody>
-          <a:bodyPr wrap="square" lIns="0" tIns="0" rIns="0" bIns="0" rtlCol="0">
-            <a:spAutoFit/>
-          </a:bodyPr>
-          <a:lstStyle>
-            <a:defPPr>
-              <a:defRPr lang="en-US"/>
-            </a:defPPr>
-            <a:lvl1pPr algn="r">
-              <a:defRPr sz="1400">
-                <a:solidFill>
-                  <a:srgbClr val="0070C0"/>
-                </a:solidFill>
-              </a:defRPr>
-            </a:lvl1pPr>
-          </a:lstStyle>
-          <a:p>
-            <a:r>
-              <a:rPr lang="en-US" sz="1200" dirty="0" err="1">
-                <a:solidFill>
-                  <a:srgbClr val="7030A0"/>
-                </a:solidFill>
-              </a:rPr>
-              <a:t>resetData</a:t>
-            </a:r>
-            <a:r>
-              <a:rPr lang="en-US" sz="1200" dirty="0">
-                <a:solidFill>
-                  <a:srgbClr val="7030A0"/>
-                </a:solidFill>
-              </a:rPr>
-              <a:t>(</a:t>
-            </a:r>
-            <a:r>
-              <a:rPr lang="en-US" sz="1200" dirty="0" err="1">
-                <a:solidFill>
-                  <a:srgbClr val="7030A0"/>
-                </a:solidFill>
-              </a:rPr>
-              <a:t>ReadOnlyAddressBook</a:t>
-            </a:r>
-            <a:r>
-              <a:rPr lang="en-US" sz="1200" dirty="0">
-                <a:solidFill>
-                  <a:srgbClr val="7030A0"/>
-                </a:solidFill>
-              </a:rPr>
-              <a:t>)</a:t>
-            </a:r>
-            <a:endParaRPr lang="en-US" sz="1200" dirty="0"/>
-          </a:p>
-        </p:txBody>
-      </p:sp>
-      <p:cxnSp>
-        <p:nvCxnSpPr>
-          <p:cNvPr id="89" name="Straight Connector 88">
-            <a:extLst>
-              <a:ext uri="{FF2B5EF4-FFF2-40B4-BE49-F238E27FC236}">
-                <a16:creationId xmlns:a16="http://schemas.microsoft.com/office/drawing/2014/main" id="{E4E1C8CA-49DF-45D8-80A5-D5C8282EE927}"/>
-              </a:ext>
-            </a:extLst>
-          </p:cNvPr>
-          <p:cNvCxnSpPr>
-            <a:cxnSpLocks/>
-          </p:cNvCxnSpPr>
-          <p:nvPr/>
-        </p:nvCxnSpPr>
-        <p:spPr>
-          <a:xfrm>
-            <a:off x="8588043" y="2871355"/>
-            <a:ext cx="17996" cy="1467648"/>
-          </a:xfrm>
-          <a:prstGeom prst="line">
-            <a:avLst/>
-          </a:prstGeom>
-          <a:ln w="19050">
-            <a:solidFill>
-              <a:srgbClr val="7030A0"/>
-            </a:solidFill>
-            <a:prstDash val="sysDash"/>
-          </a:ln>
-          <a:effectLst/>
-        </p:spPr>
-        <p:style>
-          <a:lnRef idx="1">
-            <a:schemeClr val="accent1"/>
-          </a:lnRef>
-          <a:fillRef idx="2">
-            <a:schemeClr val="accent1"/>
-          </a:fillRef>
-          <a:effectRef idx="1">
-            <a:schemeClr val="accent1"/>
-          </a:effectRef>
-          <a:fontRef idx="minor">
-            <a:schemeClr val="dk1"/>
-          </a:fontRef>
-        </p:style>
-      </p:cxnSp>
-      <p:sp>
-        <p:nvSpPr>
-          <p:cNvPr id="41" name="TextBox 40"/>
-          <p:cNvSpPr txBox="1"/>
-          <p:nvPr/>
-        </p:nvSpPr>
-        <p:spPr>
-          <a:xfrm>
-            <a:off x="7667691" y="2975344"/>
-            <a:ext cx="551687" cy="184666"/>
-          </a:xfrm>
-          <a:prstGeom prst="rect">
-            <a:avLst/>
-          </a:prstGeom>
-          <a:noFill/>
-          <a:ln>
-            <a:noFill/>
-          </a:ln>
-        </p:spPr>
-        <p:txBody>
-          <a:bodyPr wrap="square" lIns="0" tIns="0" rIns="0" bIns="0" rtlCol="0">
-            <a:spAutoFit/>
-          </a:bodyPr>
-          <a:lstStyle>
-            <a:defPPr>
-              <a:defRPr lang="en-US"/>
-            </a:defPPr>
-            <a:lvl1pPr algn="r">
-              <a:defRPr sz="1400">
-                <a:solidFill>
-                  <a:srgbClr val="0070C0"/>
-                </a:solidFill>
-              </a:defRPr>
-            </a:lvl1pPr>
-          </a:lstStyle>
-          <a:p>
-            <a:r>
-              <a:rPr lang="en-US" sz="1200" dirty="0">
-                <a:solidFill>
-                  <a:srgbClr val="7030A0"/>
-                </a:solidFill>
-              </a:rPr>
-              <a:t>undo</a:t>
-            </a:r>
-            <a:r>
-              <a:rPr lang="en-US" sz="1200" dirty="0">
-                <a:solidFill>
-                  <a:schemeClr val="accent4">
-                    <a:lumMod val="75000"/>
-                  </a:schemeClr>
-                </a:solidFill>
-              </a:rPr>
-              <a:t>()</a:t>
-            </a:r>
-          </a:p>
-        </p:txBody>
-      </p:sp>
-      <p:cxnSp>
-        <p:nvCxnSpPr>
-          <p:cNvPr id="13" name="Curved Connector 12"/>
-          <p:cNvCxnSpPr/>
-          <p:nvPr/>
-        </p:nvCxnSpPr>
-        <p:spPr>
-          <a:xfrm rot="16200000" flipH="1">
-            <a:off x="8527578" y="3220579"/>
-            <a:ext cx="156923" cy="76200"/>
-          </a:xfrm>
-          <a:prstGeom prst="curvedConnector4">
-            <a:avLst>
-              <a:gd name="adj1" fmla="val -145677"/>
-              <a:gd name="adj2" fmla="val 400000"/>
-            </a:avLst>
-          </a:prstGeom>
-          <a:ln>
-            <a:solidFill>
-              <a:srgbClr val="7030A0"/>
-            </a:solidFill>
-            <a:tailEnd type="triangle"/>
-          </a:ln>
-        </p:spPr>
-        <p:style>
-          <a:lnRef idx="1">
-            <a:schemeClr val="accent1"/>
-          </a:lnRef>
-          <a:fillRef idx="0">
-            <a:schemeClr val="accent1"/>
-          </a:fillRef>
-          <a:effectRef idx="0">
-            <a:schemeClr val="accent1"/>
-          </a:effectRef>
-          <a:fontRef idx="minor">
-            <a:schemeClr val="tx1"/>
-          </a:fontRef>
-        </p:style>
-      </p:cxnSp>
-      <p:cxnSp>
-        <p:nvCxnSpPr>
-          <p:cNvPr id="52" name="Straight Arrow Connector 51"/>
-          <p:cNvCxnSpPr>
-            <a:cxnSpLocks/>
-          </p:cNvCxnSpPr>
-          <p:nvPr/>
-        </p:nvCxnSpPr>
-        <p:spPr>
-          <a:xfrm>
-            <a:off x="7043991" y="3182839"/>
-            <a:ext cx="1470216" cy="0"/>
-          </a:xfrm>
-          <a:prstGeom prst="straightConnector1">
-            <a:avLst/>
-          </a:prstGeom>
-          <a:ln w="19050">
-            <a:solidFill>
-              <a:srgbClr val="7030A0"/>
-            </a:solidFill>
-            <a:tailEnd type="arrow"/>
-          </a:ln>
-        </p:spPr>
-        <p:style>
-          <a:lnRef idx="1">
-            <a:schemeClr val="accent1"/>
-          </a:lnRef>
-          <a:fillRef idx="0">
-            <a:schemeClr val="accent1"/>
-          </a:fillRef>
-          <a:effectRef idx="0">
-            <a:schemeClr val="accent1"/>
-          </a:effectRef>
-          <a:fontRef idx="minor">
-            <a:schemeClr val="tx1"/>
-          </a:fontRef>
-        </p:style>
-      </p:cxnSp>
-      <p:cxnSp>
-        <p:nvCxnSpPr>
-          <p:cNvPr id="60" name="Straight Arrow Connector 59">
-            <a:extLst>
-              <a:ext uri="{FF2B5EF4-FFF2-40B4-BE49-F238E27FC236}">
-                <a16:creationId xmlns:a16="http://schemas.microsoft.com/office/drawing/2014/main" id="{7C9F21BC-13A9-471F-825A-2621FD36355F}"/>
-              </a:ext>
-            </a:extLst>
-          </p:cNvPr>
-          <p:cNvCxnSpPr>
-            <a:cxnSpLocks/>
-          </p:cNvCxnSpPr>
-          <p:nvPr/>
-        </p:nvCxnSpPr>
-        <p:spPr>
-          <a:xfrm flipV="1">
-            <a:off x="7043991" y="3564914"/>
-            <a:ext cx="1470216" cy="6325"/>
-          </a:xfrm>
-          <a:prstGeom prst="straightConnector1">
-            <a:avLst/>
-          </a:prstGeom>
-          <a:ln w="19050">
-            <a:solidFill>
-              <a:srgbClr val="7030A0"/>
             </a:solidFill>
             <a:prstDash val="sysDash"/>
             <a:headEnd type="arrow" w="med" len="med"/>
@@ -5365,14 +4953,13 @@
           </p:cNvPr>
           <p:cNvCxnSpPr>
             <a:cxnSpLocks/>
-            <a:endCxn id="49" idx="2"/>
           </p:cNvCxnSpPr>
           <p:nvPr/>
         </p:nvCxnSpPr>
         <p:spPr>
           <a:xfrm>
-            <a:off x="5675919" y="3733799"/>
-            <a:ext cx="1296056" cy="0"/>
+            <a:off x="3966208" y="2570878"/>
+            <a:ext cx="1465675" cy="0"/>
           </a:xfrm>
           <a:prstGeom prst="straightConnector1">
             <a:avLst/>
@@ -5380,6 +4967,1043 @@
           <a:ln w="19050">
             <a:solidFill>
               <a:srgbClr val="7030A0"/>
+            </a:solidFill>
+            <a:prstDash val="sysDash"/>
+            <a:headEnd type="arrow" w="med" len="med"/>
+            <a:tailEnd type="none" w="med" len="med"/>
+          </a:ln>
+        </p:spPr>
+        <p:style>
+          <a:lnRef idx="1">
+            <a:schemeClr val="accent1"/>
+          </a:lnRef>
+          <a:fillRef idx="0">
+            <a:schemeClr val="accent1"/>
+          </a:fillRef>
+          <a:effectRef idx="0">
+            <a:schemeClr val="accent1"/>
+          </a:effectRef>
+          <a:fontRef idx="minor">
+            <a:schemeClr val="tx1"/>
+          </a:fontRef>
+        </p:style>
+      </p:cxnSp>
+      <p:sp>
+        <p:nvSpPr>
+          <p:cNvPr id="74" name="TextBox 73">
+            <a:extLst>
+              <a:ext uri="{FF2B5EF4-FFF2-40B4-BE49-F238E27FC236}">
+                <a16:creationId xmlns:a16="http://schemas.microsoft.com/office/drawing/2014/main" id="{9D553F04-DE6C-B448-AE5E-2B71F0FEBF87}"/>
+              </a:ext>
+            </a:extLst>
+          </p:cNvPr>
+          <p:cNvSpPr txBox="1"/>
+          <p:nvPr/>
+        </p:nvSpPr>
+        <p:spPr>
+          <a:xfrm>
+            <a:off x="4264522" y="2643307"/>
+            <a:ext cx="1298078" cy="169277"/>
+          </a:xfrm>
+          <a:prstGeom prst="rect">
+            <a:avLst/>
+          </a:prstGeom>
+          <a:noFill/>
+        </p:spPr>
+        <p:txBody>
+          <a:bodyPr wrap="square" lIns="0" tIns="0" rIns="0" bIns="0" rtlCol="0">
+            <a:spAutoFit/>
+          </a:bodyPr>
+          <a:lstStyle>
+            <a:defPPr>
+              <a:defRPr lang="en-US"/>
+            </a:defPPr>
+            <a:lvl1pPr algn="r">
+              <a:defRPr sz="1400">
+                <a:solidFill>
+                  <a:srgbClr val="0070C0"/>
+                </a:solidFill>
+              </a:defRPr>
+            </a:lvl1pPr>
+          </a:lstStyle>
+          <a:p>
+            <a:pPr algn="l"/>
+            <a:r>
+              <a:rPr lang="en-US" sz="1100" dirty="0" err="1">
+                <a:solidFill>
+                  <a:schemeClr val="accent4">
+                    <a:lumMod val="75000"/>
+                  </a:schemeClr>
+                </a:solidFill>
+              </a:rPr>
+              <a:t>setQuizMode</a:t>
+            </a:r>
+            <a:r>
+              <a:rPr lang="en-US" sz="1100" dirty="0">
+                <a:solidFill>
+                  <a:schemeClr val="accent4">
+                    <a:lumMod val="75000"/>
+                  </a:schemeClr>
+                </a:solidFill>
+              </a:rPr>
+              <a:t>()</a:t>
+            </a:r>
+            <a:endParaRPr lang="en-US" sz="1100" dirty="0"/>
+          </a:p>
+        </p:txBody>
+      </p:sp>
+      <p:sp>
+        <p:nvSpPr>
+          <p:cNvPr id="75" name="Rectangle 74">
+            <a:extLst>
+              <a:ext uri="{FF2B5EF4-FFF2-40B4-BE49-F238E27FC236}">
+                <a16:creationId xmlns:a16="http://schemas.microsoft.com/office/drawing/2014/main" id="{35978E15-84D6-D144-97C9-627B6D6A0372}"/>
+              </a:ext>
+            </a:extLst>
+          </p:cNvPr>
+          <p:cNvSpPr/>
+          <p:nvPr/>
+        </p:nvSpPr>
+        <p:spPr>
+          <a:xfrm>
+            <a:off x="5373852" y="2843035"/>
+            <a:ext cx="168896" cy="832337"/>
+          </a:xfrm>
+          <a:prstGeom prst="rect">
+            <a:avLst/>
+          </a:prstGeom>
+          <a:solidFill>
+            <a:srgbClr val="7030A0"/>
+          </a:solidFill>
+          <a:ln>
+            <a:solidFill>
+              <a:srgbClr val="7030A0"/>
+            </a:solidFill>
+          </a:ln>
+          <a:effectLst/>
+        </p:spPr>
+        <p:style>
+          <a:lnRef idx="1">
+            <a:schemeClr val="accent3"/>
+          </a:lnRef>
+          <a:fillRef idx="2">
+            <a:schemeClr val="accent3"/>
+          </a:fillRef>
+          <a:effectRef idx="1">
+            <a:schemeClr val="accent3"/>
+          </a:effectRef>
+          <a:fontRef idx="minor">
+            <a:schemeClr val="dk1"/>
+          </a:fontRef>
+        </p:style>
+        <p:txBody>
+          <a:bodyPr rtlCol="0" anchor="ctr"/>
+          <a:lstStyle/>
+          <a:p>
+            <a:pPr algn="ctr"/>
+            <a:endParaRPr lang="en-SG" sz="1400"/>
+          </a:p>
+        </p:txBody>
+      </p:sp>
+      <p:cxnSp>
+        <p:nvCxnSpPr>
+          <p:cNvPr id="76" name="Straight Arrow Connector 75">
+            <a:extLst>
+              <a:ext uri="{FF2B5EF4-FFF2-40B4-BE49-F238E27FC236}">
+                <a16:creationId xmlns:a16="http://schemas.microsoft.com/office/drawing/2014/main" id="{7D9CD7B7-4CBC-7949-81CB-21BAB8AE1DA0}"/>
+              </a:ext>
+            </a:extLst>
+          </p:cNvPr>
+          <p:cNvCxnSpPr>
+            <a:cxnSpLocks/>
+          </p:cNvCxnSpPr>
+          <p:nvPr/>
+        </p:nvCxnSpPr>
+        <p:spPr>
+          <a:xfrm>
+            <a:off x="3976777" y="2843035"/>
+            <a:ext cx="1383207" cy="0"/>
+          </a:xfrm>
+          <a:prstGeom prst="straightConnector1">
+            <a:avLst/>
+          </a:prstGeom>
+          <a:ln w="19050">
+            <a:solidFill>
+              <a:srgbClr val="0070C0"/>
+            </a:solidFill>
+            <a:tailEnd type="arrow"/>
+          </a:ln>
+        </p:spPr>
+        <p:style>
+          <a:lnRef idx="1">
+            <a:schemeClr val="accent1"/>
+          </a:lnRef>
+          <a:fillRef idx="0">
+            <a:schemeClr val="accent1"/>
+          </a:fillRef>
+          <a:effectRef idx="0">
+            <a:schemeClr val="accent1"/>
+          </a:effectRef>
+          <a:fontRef idx="minor">
+            <a:schemeClr val="tx1"/>
+          </a:fontRef>
+        </p:style>
+      </p:cxnSp>
+      <p:cxnSp>
+        <p:nvCxnSpPr>
+          <p:cNvPr id="77" name="Straight Arrow Connector 76">
+            <a:extLst>
+              <a:ext uri="{FF2B5EF4-FFF2-40B4-BE49-F238E27FC236}">
+                <a16:creationId xmlns:a16="http://schemas.microsoft.com/office/drawing/2014/main" id="{8A607BA1-3BA0-A444-8C41-BA01388804CC}"/>
+              </a:ext>
+            </a:extLst>
+          </p:cNvPr>
+          <p:cNvCxnSpPr>
+            <a:cxnSpLocks/>
+          </p:cNvCxnSpPr>
+          <p:nvPr/>
+        </p:nvCxnSpPr>
+        <p:spPr>
+          <a:xfrm>
+            <a:off x="3966208" y="3663759"/>
+            <a:ext cx="1465675" cy="0"/>
+          </a:xfrm>
+          <a:prstGeom prst="straightConnector1">
+            <a:avLst/>
+          </a:prstGeom>
+          <a:ln w="19050">
+            <a:solidFill>
+              <a:srgbClr val="7030A0"/>
+            </a:solidFill>
+            <a:prstDash val="sysDash"/>
+            <a:headEnd type="arrow" w="med" len="med"/>
+            <a:tailEnd type="none" w="med" len="med"/>
+          </a:ln>
+        </p:spPr>
+        <p:style>
+          <a:lnRef idx="1">
+            <a:schemeClr val="accent1"/>
+          </a:lnRef>
+          <a:fillRef idx="0">
+            <a:schemeClr val="accent1"/>
+          </a:fillRef>
+          <a:effectRef idx="0">
+            <a:schemeClr val="accent1"/>
+          </a:effectRef>
+          <a:fontRef idx="minor">
+            <a:schemeClr val="tx1"/>
+          </a:fontRef>
+        </p:style>
+      </p:cxnSp>
+      <p:sp>
+        <p:nvSpPr>
+          <p:cNvPr id="78" name="Rectangle 65">
+            <a:extLst>
+              <a:ext uri="{FF2B5EF4-FFF2-40B4-BE49-F238E27FC236}">
+                <a16:creationId xmlns:a16="http://schemas.microsoft.com/office/drawing/2014/main" id="{C568656B-C309-CF4D-9E91-33F52CFD7997}"/>
+              </a:ext>
+            </a:extLst>
+          </p:cNvPr>
+          <p:cNvSpPr/>
+          <p:nvPr/>
+        </p:nvSpPr>
+        <p:spPr>
+          <a:xfrm>
+            <a:off x="6184030" y="193128"/>
+            <a:ext cx="2655007" cy="4340772"/>
+          </a:xfrm>
+          <a:prstGeom prst="roundRect">
+            <a:avLst>
+              <a:gd name="adj" fmla="val 6750"/>
+            </a:avLst>
+          </a:prstGeom>
+          <a:solidFill>
+            <a:schemeClr val="accent3">
+              <a:lumMod val="20000"/>
+              <a:lumOff val="80000"/>
+            </a:schemeClr>
+          </a:solidFill>
+          <a:ln w="19050">
+            <a:noFill/>
+          </a:ln>
+          <a:effectLst/>
+        </p:spPr>
+        <p:style>
+          <a:lnRef idx="1">
+            <a:schemeClr val="accent2"/>
+          </a:lnRef>
+          <a:fillRef idx="2">
+            <a:schemeClr val="accent2"/>
+          </a:fillRef>
+          <a:effectRef idx="1">
+            <a:schemeClr val="accent2"/>
+          </a:effectRef>
+          <a:fontRef idx="minor">
+            <a:schemeClr val="dk1"/>
+          </a:fontRef>
+        </p:style>
+        <p:txBody>
+          <a:bodyPr rtlCol="0" anchor="t"/>
+          <a:lstStyle/>
+          <a:p>
+            <a:r>
+              <a:rPr lang="en-US" sz="1200" b="1" dirty="0">
+                <a:solidFill>
+                  <a:schemeClr val="accent3">
+                    <a:lumMod val="50000"/>
+                  </a:schemeClr>
+                </a:solidFill>
+              </a:rPr>
+              <a:t>UI</a:t>
+            </a:r>
+            <a:endParaRPr lang="en-SG" sz="1200" b="1" dirty="0">
+              <a:solidFill>
+                <a:schemeClr val="accent3">
+                  <a:lumMod val="50000"/>
+                </a:schemeClr>
+              </a:solidFill>
+            </a:endParaRPr>
+          </a:p>
+        </p:txBody>
+      </p:sp>
+      <p:sp>
+        <p:nvSpPr>
+          <p:cNvPr id="85" name="Rectangle 62">
+            <a:extLst>
+              <a:ext uri="{FF2B5EF4-FFF2-40B4-BE49-F238E27FC236}">
+                <a16:creationId xmlns:a16="http://schemas.microsoft.com/office/drawing/2014/main" id="{B43FC34F-3335-B24D-AF5C-172442DDDE69}"/>
+              </a:ext>
+            </a:extLst>
+          </p:cNvPr>
+          <p:cNvSpPr/>
+          <p:nvPr/>
+        </p:nvSpPr>
+        <p:spPr>
+          <a:xfrm>
+            <a:off x="6346030" y="1985820"/>
+            <a:ext cx="1228531" cy="300180"/>
+          </a:xfrm>
+          <a:prstGeom prst="rect">
+            <a:avLst/>
+          </a:prstGeom>
+          <a:solidFill>
+            <a:schemeClr val="accent3">
+              <a:lumMod val="75000"/>
+            </a:schemeClr>
+          </a:solidFill>
+          <a:ln w="19050">
+            <a:solidFill>
+              <a:schemeClr val="accent3">
+                <a:lumMod val="75000"/>
+              </a:schemeClr>
+            </a:solidFill>
+          </a:ln>
+          <a:effectLst/>
+        </p:spPr>
+        <p:style>
+          <a:lnRef idx="1">
+            <a:schemeClr val="accent2"/>
+          </a:lnRef>
+          <a:fillRef idx="2">
+            <a:schemeClr val="accent2"/>
+          </a:fillRef>
+          <a:effectRef idx="1">
+            <a:schemeClr val="accent2"/>
+          </a:effectRef>
+          <a:fontRef idx="minor">
+            <a:schemeClr val="dk1"/>
+          </a:fontRef>
+        </p:style>
+        <p:txBody>
+          <a:bodyPr rtlCol="0" anchor="ctr"/>
+          <a:lstStyle/>
+          <a:p>
+            <a:pPr algn="ctr"/>
+            <a:r>
+              <a:rPr lang="en-US" sz="1400" dirty="0">
+                <a:solidFill>
+                  <a:schemeClr val="bg1"/>
+                </a:solidFill>
+              </a:rPr>
+              <a:t>:</a:t>
+            </a:r>
+            <a:r>
+              <a:rPr lang="en-US" sz="1400" dirty="0" err="1">
+                <a:solidFill>
+                  <a:schemeClr val="bg1"/>
+                </a:solidFill>
+              </a:rPr>
+              <a:t>MainWindow</a:t>
+            </a:r>
+            <a:endParaRPr lang="en-SG" sz="1400" dirty="0">
+              <a:solidFill>
+                <a:schemeClr val="bg1"/>
+              </a:solidFill>
+            </a:endParaRPr>
+          </a:p>
+        </p:txBody>
+      </p:sp>
+      <p:cxnSp>
+        <p:nvCxnSpPr>
+          <p:cNvPr id="87" name="Straight Connector 86">
+            <a:extLst>
+              <a:ext uri="{FF2B5EF4-FFF2-40B4-BE49-F238E27FC236}">
+                <a16:creationId xmlns:a16="http://schemas.microsoft.com/office/drawing/2014/main" id="{39ED94F6-769A-984A-A95F-5E58A89EC17B}"/>
+              </a:ext>
+            </a:extLst>
+          </p:cNvPr>
+          <p:cNvCxnSpPr>
+            <a:cxnSpLocks/>
+            <a:stCxn id="85" idx="2"/>
+          </p:cNvCxnSpPr>
+          <p:nvPr/>
+        </p:nvCxnSpPr>
+        <p:spPr>
+          <a:xfrm>
+            <a:off x="6960296" y="2286000"/>
+            <a:ext cx="13310" cy="1604377"/>
+          </a:xfrm>
+          <a:prstGeom prst="line">
+            <a:avLst/>
+          </a:prstGeom>
+          <a:ln w="19050">
+            <a:solidFill>
+              <a:schemeClr val="accent3">
+                <a:lumMod val="50000"/>
+              </a:schemeClr>
+            </a:solidFill>
+            <a:prstDash val="sysDash"/>
+          </a:ln>
+          <a:effectLst/>
+        </p:spPr>
+        <p:style>
+          <a:lnRef idx="1">
+            <a:schemeClr val="accent1"/>
+          </a:lnRef>
+          <a:fillRef idx="2">
+            <a:schemeClr val="accent1"/>
+          </a:fillRef>
+          <a:effectRef idx="1">
+            <a:schemeClr val="accent1"/>
+          </a:effectRef>
+          <a:fontRef idx="minor">
+            <a:schemeClr val="dk1"/>
+          </a:fontRef>
+        </p:style>
+      </p:cxnSp>
+      <p:cxnSp>
+        <p:nvCxnSpPr>
+          <p:cNvPr id="90" name="Straight Arrow Connector 89">
+            <a:extLst>
+              <a:ext uri="{FF2B5EF4-FFF2-40B4-BE49-F238E27FC236}">
+                <a16:creationId xmlns:a16="http://schemas.microsoft.com/office/drawing/2014/main" id="{EF12A628-35F0-494E-9D1B-7E6648B5B50D}"/>
+              </a:ext>
+            </a:extLst>
+          </p:cNvPr>
+          <p:cNvCxnSpPr>
+            <a:cxnSpLocks/>
+          </p:cNvCxnSpPr>
+          <p:nvPr/>
+        </p:nvCxnSpPr>
+        <p:spPr>
+          <a:xfrm>
+            <a:off x="5542748" y="2891368"/>
+            <a:ext cx="1349858" cy="0"/>
+          </a:xfrm>
+          <a:prstGeom prst="straightConnector1">
+            <a:avLst/>
+          </a:prstGeom>
+          <a:ln w="19050">
+            <a:solidFill>
+              <a:srgbClr val="7030A0"/>
+            </a:solidFill>
+            <a:tailEnd type="arrow"/>
+          </a:ln>
+        </p:spPr>
+        <p:style>
+          <a:lnRef idx="1">
+            <a:schemeClr val="accent1"/>
+          </a:lnRef>
+          <a:fillRef idx="0">
+            <a:schemeClr val="accent1"/>
+          </a:fillRef>
+          <a:effectRef idx="0">
+            <a:schemeClr val="accent1"/>
+          </a:effectRef>
+          <a:fontRef idx="minor">
+            <a:schemeClr val="tx1"/>
+          </a:fontRef>
+        </p:style>
+      </p:cxnSp>
+      <p:sp>
+        <p:nvSpPr>
+          <p:cNvPr id="91" name="TextBox 90">
+            <a:extLst>
+              <a:ext uri="{FF2B5EF4-FFF2-40B4-BE49-F238E27FC236}">
+                <a16:creationId xmlns:a16="http://schemas.microsoft.com/office/drawing/2014/main" id="{F65A5591-D795-2E42-B23D-0C8045E26368}"/>
+              </a:ext>
+            </a:extLst>
+          </p:cNvPr>
+          <p:cNvSpPr txBox="1"/>
+          <p:nvPr/>
+        </p:nvSpPr>
+        <p:spPr>
+          <a:xfrm>
+            <a:off x="5486400" y="2524492"/>
+            <a:ext cx="1516004" cy="307777"/>
+          </a:xfrm>
+          <a:prstGeom prst="rect">
+            <a:avLst/>
+          </a:prstGeom>
+          <a:noFill/>
+        </p:spPr>
+        <p:txBody>
+          <a:bodyPr wrap="square" lIns="0" tIns="0" rIns="0" bIns="0" rtlCol="0">
+            <a:spAutoFit/>
+          </a:bodyPr>
+          <a:lstStyle>
+            <a:defPPr>
+              <a:defRPr lang="en-US"/>
+            </a:defPPr>
+            <a:lvl1pPr algn="r">
+              <a:defRPr sz="1400">
+                <a:solidFill>
+                  <a:srgbClr val="0070C0"/>
+                </a:solidFill>
+              </a:defRPr>
+            </a:lvl1pPr>
+          </a:lstStyle>
+          <a:p>
+            <a:pPr algn="ctr"/>
+            <a:r>
+              <a:rPr lang="en-US" sz="1000" dirty="0">
+                <a:solidFill>
+                  <a:schemeClr val="accent3">
+                    <a:lumMod val="50000"/>
+                  </a:schemeClr>
+                </a:solidFill>
+              </a:rPr>
+              <a:t>&lt;&lt;Event&gt;&gt;</a:t>
+            </a:r>
+          </a:p>
+          <a:p>
+            <a:pPr algn="ctr"/>
+            <a:r>
+              <a:rPr lang="en-US" sz="1000" dirty="0" err="1">
+                <a:solidFill>
+                  <a:schemeClr val="accent3">
+                    <a:lumMod val="50000"/>
+                  </a:schemeClr>
+                </a:solidFill>
+              </a:rPr>
+              <a:t>fireValueChangedEvent</a:t>
+            </a:r>
+            <a:r>
+              <a:rPr lang="en-US" sz="1000" dirty="0">
+                <a:solidFill>
+                  <a:schemeClr val="accent3">
+                    <a:lumMod val="50000"/>
+                  </a:schemeClr>
+                </a:solidFill>
+              </a:rPr>
+              <a:t>()</a:t>
+            </a:r>
+          </a:p>
+        </p:txBody>
+      </p:sp>
+      <p:sp>
+        <p:nvSpPr>
+          <p:cNvPr id="97" name="Rectangle 96">
+            <a:extLst>
+              <a:ext uri="{FF2B5EF4-FFF2-40B4-BE49-F238E27FC236}">
+                <a16:creationId xmlns:a16="http://schemas.microsoft.com/office/drawing/2014/main" id="{846B599F-F337-044F-A9D3-120E88126A49}"/>
+              </a:ext>
+            </a:extLst>
+          </p:cNvPr>
+          <p:cNvSpPr/>
+          <p:nvPr/>
+        </p:nvSpPr>
+        <p:spPr>
+          <a:xfrm>
+            <a:off x="6892606" y="2891368"/>
+            <a:ext cx="168896" cy="766227"/>
+          </a:xfrm>
+          <a:prstGeom prst="rect">
+            <a:avLst/>
+          </a:prstGeom>
+          <a:solidFill>
+            <a:schemeClr val="accent3">
+              <a:lumMod val="75000"/>
+            </a:schemeClr>
+          </a:solidFill>
+          <a:ln>
+            <a:solidFill>
+              <a:schemeClr val="accent3">
+                <a:lumMod val="75000"/>
+              </a:schemeClr>
+            </a:solidFill>
+          </a:ln>
+          <a:effectLst/>
+        </p:spPr>
+        <p:style>
+          <a:lnRef idx="1">
+            <a:schemeClr val="accent3"/>
+          </a:lnRef>
+          <a:fillRef idx="2">
+            <a:schemeClr val="accent3"/>
+          </a:fillRef>
+          <a:effectRef idx="1">
+            <a:schemeClr val="accent3"/>
+          </a:effectRef>
+          <a:fontRef idx="minor">
+            <a:schemeClr val="dk1"/>
+          </a:fontRef>
+        </p:style>
+        <p:txBody>
+          <a:bodyPr rtlCol="0" anchor="ctr"/>
+          <a:lstStyle/>
+          <a:p>
+            <a:pPr algn="ctr"/>
+            <a:endParaRPr lang="en-SG" sz="1400"/>
+          </a:p>
+        </p:txBody>
+      </p:sp>
+      <p:sp>
+        <p:nvSpPr>
+          <p:cNvPr id="101" name="Rectangle 62">
+            <a:extLst>
+              <a:ext uri="{FF2B5EF4-FFF2-40B4-BE49-F238E27FC236}">
+                <a16:creationId xmlns:a16="http://schemas.microsoft.com/office/drawing/2014/main" id="{0C568559-64B8-D645-BD0E-99319E5687D6}"/>
+              </a:ext>
+            </a:extLst>
+          </p:cNvPr>
+          <p:cNvSpPr/>
+          <p:nvPr/>
+        </p:nvSpPr>
+        <p:spPr>
+          <a:xfrm>
+            <a:off x="7446902" y="2807556"/>
+            <a:ext cx="1228531" cy="300180"/>
+          </a:xfrm>
+          <a:prstGeom prst="rect">
+            <a:avLst/>
+          </a:prstGeom>
+          <a:solidFill>
+            <a:schemeClr val="accent3">
+              <a:lumMod val="75000"/>
+            </a:schemeClr>
+          </a:solidFill>
+          <a:ln w="19050">
+            <a:solidFill>
+              <a:schemeClr val="accent3">
+                <a:lumMod val="75000"/>
+              </a:schemeClr>
+            </a:solidFill>
+          </a:ln>
+          <a:effectLst/>
+        </p:spPr>
+        <p:style>
+          <a:lnRef idx="1">
+            <a:schemeClr val="accent2"/>
+          </a:lnRef>
+          <a:fillRef idx="2">
+            <a:schemeClr val="accent2"/>
+          </a:fillRef>
+          <a:effectRef idx="1">
+            <a:schemeClr val="accent2"/>
+          </a:effectRef>
+          <a:fontRef idx="minor">
+            <a:schemeClr val="dk1"/>
+          </a:fontRef>
+        </p:style>
+        <p:txBody>
+          <a:bodyPr rtlCol="0" anchor="ctr"/>
+          <a:lstStyle/>
+          <a:p>
+            <a:pPr algn="ctr"/>
+            <a:r>
+              <a:rPr lang="en-US" sz="1400" dirty="0" err="1">
+                <a:solidFill>
+                  <a:schemeClr val="bg1"/>
+                </a:solidFill>
+              </a:rPr>
+              <a:t>qp:QuizPanel</a:t>
+            </a:r>
+            <a:endParaRPr lang="en-SG" sz="1400" dirty="0">
+              <a:solidFill>
+                <a:schemeClr val="bg1"/>
+              </a:solidFill>
+            </a:endParaRPr>
+          </a:p>
+        </p:txBody>
+      </p:sp>
+      <p:cxnSp>
+        <p:nvCxnSpPr>
+          <p:cNvPr id="102" name="Straight Arrow Connector 101">
+            <a:extLst>
+              <a:ext uri="{FF2B5EF4-FFF2-40B4-BE49-F238E27FC236}">
+                <a16:creationId xmlns:a16="http://schemas.microsoft.com/office/drawing/2014/main" id="{0ED92777-5D66-A74D-841B-126C31954729}"/>
+              </a:ext>
+            </a:extLst>
+          </p:cNvPr>
+          <p:cNvCxnSpPr>
+            <a:cxnSpLocks/>
+            <a:endCxn id="101" idx="1"/>
+          </p:cNvCxnSpPr>
+          <p:nvPr/>
+        </p:nvCxnSpPr>
+        <p:spPr>
+          <a:xfrm>
+            <a:off x="7061502" y="2957646"/>
+            <a:ext cx="385400" cy="0"/>
+          </a:xfrm>
+          <a:prstGeom prst="straightConnector1">
+            <a:avLst/>
+          </a:prstGeom>
+          <a:ln w="19050">
+            <a:solidFill>
+              <a:schemeClr val="accent3">
+                <a:lumMod val="50000"/>
+              </a:schemeClr>
+            </a:solidFill>
+            <a:tailEnd type="arrow"/>
+          </a:ln>
+        </p:spPr>
+        <p:style>
+          <a:lnRef idx="1">
+            <a:schemeClr val="accent1"/>
+          </a:lnRef>
+          <a:fillRef idx="0">
+            <a:schemeClr val="accent1"/>
+          </a:fillRef>
+          <a:effectRef idx="0">
+            <a:schemeClr val="accent1"/>
+          </a:effectRef>
+          <a:fontRef idx="minor">
+            <a:schemeClr val="tx1"/>
+          </a:fontRef>
+        </p:style>
+      </p:cxnSp>
+      <p:cxnSp>
+        <p:nvCxnSpPr>
+          <p:cNvPr id="116" name="Straight Connector 115">
+            <a:extLst>
+              <a:ext uri="{FF2B5EF4-FFF2-40B4-BE49-F238E27FC236}">
+                <a16:creationId xmlns:a16="http://schemas.microsoft.com/office/drawing/2014/main" id="{58CB3DAC-17E3-C94C-A630-387B653F3DE9}"/>
+              </a:ext>
+            </a:extLst>
+          </p:cNvPr>
+          <p:cNvCxnSpPr>
+            <a:cxnSpLocks/>
+          </p:cNvCxnSpPr>
+          <p:nvPr/>
+        </p:nvCxnSpPr>
+        <p:spPr>
+          <a:xfrm>
+            <a:off x="8061165" y="3105612"/>
+            <a:ext cx="0" cy="784765"/>
+          </a:xfrm>
+          <a:prstGeom prst="line">
+            <a:avLst/>
+          </a:prstGeom>
+          <a:ln w="19050">
+            <a:solidFill>
+              <a:schemeClr val="accent3">
+                <a:lumMod val="50000"/>
+              </a:schemeClr>
+            </a:solidFill>
+            <a:prstDash val="sysDash"/>
+          </a:ln>
+          <a:effectLst/>
+        </p:spPr>
+        <p:style>
+          <a:lnRef idx="1">
+            <a:schemeClr val="accent1"/>
+          </a:lnRef>
+          <a:fillRef idx="2">
+            <a:schemeClr val="accent1"/>
+          </a:fillRef>
+          <a:effectRef idx="1">
+            <a:schemeClr val="accent1"/>
+          </a:effectRef>
+          <a:fontRef idx="minor">
+            <a:schemeClr val="dk1"/>
+          </a:fontRef>
+        </p:style>
+      </p:cxnSp>
+      <p:sp>
+        <p:nvSpPr>
+          <p:cNvPr id="111" name="Rectangle 110">
+            <a:extLst>
+              <a:ext uri="{FF2B5EF4-FFF2-40B4-BE49-F238E27FC236}">
+                <a16:creationId xmlns:a16="http://schemas.microsoft.com/office/drawing/2014/main" id="{A150883A-D345-E94A-B996-F9D9F5A19130}"/>
+              </a:ext>
+            </a:extLst>
+          </p:cNvPr>
+          <p:cNvSpPr/>
+          <p:nvPr/>
+        </p:nvSpPr>
+        <p:spPr>
+          <a:xfrm>
+            <a:off x="7976719" y="3114185"/>
+            <a:ext cx="168896" cy="86215"/>
+          </a:xfrm>
+          <a:prstGeom prst="rect">
+            <a:avLst/>
+          </a:prstGeom>
+          <a:solidFill>
+            <a:schemeClr val="accent3">
+              <a:lumMod val="75000"/>
+            </a:schemeClr>
+          </a:solidFill>
+          <a:ln>
+            <a:solidFill>
+              <a:schemeClr val="accent3">
+                <a:lumMod val="75000"/>
+              </a:schemeClr>
+            </a:solidFill>
+          </a:ln>
+          <a:effectLst/>
+        </p:spPr>
+        <p:style>
+          <a:lnRef idx="1">
+            <a:schemeClr val="accent3"/>
+          </a:lnRef>
+          <a:fillRef idx="2">
+            <a:schemeClr val="accent3"/>
+          </a:fillRef>
+          <a:effectRef idx="1">
+            <a:schemeClr val="accent3"/>
+          </a:effectRef>
+          <a:fontRef idx="minor">
+            <a:schemeClr val="dk1"/>
+          </a:fontRef>
+        </p:style>
+        <p:txBody>
+          <a:bodyPr rtlCol="0" anchor="ctr"/>
+          <a:lstStyle/>
+          <a:p>
+            <a:pPr algn="ctr"/>
+            <a:endParaRPr lang="en-SG" sz="1400"/>
+          </a:p>
+        </p:txBody>
+      </p:sp>
+      <p:cxnSp>
+        <p:nvCxnSpPr>
+          <p:cNvPr id="112" name="Straight Arrow Connector 111">
+            <a:extLst>
+              <a:ext uri="{FF2B5EF4-FFF2-40B4-BE49-F238E27FC236}">
+                <a16:creationId xmlns:a16="http://schemas.microsoft.com/office/drawing/2014/main" id="{022ECDB2-0838-B346-932A-6171343A8C3A}"/>
+              </a:ext>
+            </a:extLst>
+          </p:cNvPr>
+          <p:cNvCxnSpPr>
+            <a:cxnSpLocks/>
+          </p:cNvCxnSpPr>
+          <p:nvPr/>
+        </p:nvCxnSpPr>
+        <p:spPr>
+          <a:xfrm>
+            <a:off x="7061502" y="3200400"/>
+            <a:ext cx="915217" cy="0"/>
+          </a:xfrm>
+          <a:prstGeom prst="straightConnector1">
+            <a:avLst/>
+          </a:prstGeom>
+          <a:ln w="19050">
+            <a:solidFill>
+              <a:schemeClr val="accent3">
+                <a:lumMod val="50000"/>
+              </a:schemeClr>
+            </a:solidFill>
+            <a:prstDash val="sysDash"/>
+            <a:headEnd type="arrow" w="med" len="med"/>
+            <a:tailEnd type="none" w="med" len="med"/>
+          </a:ln>
+        </p:spPr>
+        <p:style>
+          <a:lnRef idx="1">
+            <a:schemeClr val="accent1"/>
+          </a:lnRef>
+          <a:fillRef idx="0">
+            <a:schemeClr val="accent1"/>
+          </a:fillRef>
+          <a:effectRef idx="0">
+            <a:schemeClr val="accent1"/>
+          </a:effectRef>
+          <a:fontRef idx="minor">
+            <a:schemeClr val="tx1"/>
+          </a:fontRef>
+        </p:style>
+      </p:cxnSp>
+      <p:sp>
+        <p:nvSpPr>
+          <p:cNvPr id="124" name="Rectangle 123">
+            <a:extLst>
+              <a:ext uri="{FF2B5EF4-FFF2-40B4-BE49-F238E27FC236}">
+                <a16:creationId xmlns:a16="http://schemas.microsoft.com/office/drawing/2014/main" id="{188BAC8C-9525-7347-8614-629064487004}"/>
+              </a:ext>
+            </a:extLst>
+          </p:cNvPr>
+          <p:cNvSpPr/>
+          <p:nvPr/>
+        </p:nvSpPr>
+        <p:spPr>
+          <a:xfrm>
+            <a:off x="6995982" y="3310513"/>
+            <a:ext cx="88115" cy="288334"/>
+          </a:xfrm>
+          <a:prstGeom prst="rect">
+            <a:avLst/>
+          </a:prstGeom>
+          <a:solidFill>
+            <a:schemeClr val="accent3">
+              <a:lumMod val="75000"/>
+            </a:schemeClr>
+          </a:solidFill>
+          <a:ln>
+            <a:solidFill>
+              <a:schemeClr val="accent3">
+                <a:lumMod val="50000"/>
+              </a:schemeClr>
+            </a:solidFill>
+          </a:ln>
+          <a:effectLst/>
+        </p:spPr>
+        <p:style>
+          <a:lnRef idx="1">
+            <a:schemeClr val="accent3"/>
+          </a:lnRef>
+          <a:fillRef idx="2">
+            <a:schemeClr val="accent3"/>
+          </a:fillRef>
+          <a:effectRef idx="1">
+            <a:schemeClr val="accent3"/>
+          </a:effectRef>
+          <a:fontRef idx="minor">
+            <a:schemeClr val="dk1"/>
+          </a:fontRef>
+        </p:style>
+        <p:txBody>
+          <a:bodyPr rtlCol="0" anchor="ctr"/>
+          <a:lstStyle/>
+          <a:p>
+            <a:pPr algn="ctr"/>
+            <a:endParaRPr lang="en-SG" sz="1400"/>
+          </a:p>
+        </p:txBody>
+      </p:sp>
+      <p:sp>
+        <p:nvSpPr>
+          <p:cNvPr id="125" name="TextBox 124">
+            <a:extLst>
+              <a:ext uri="{FF2B5EF4-FFF2-40B4-BE49-F238E27FC236}">
+                <a16:creationId xmlns:a16="http://schemas.microsoft.com/office/drawing/2014/main" id="{33D75B90-5046-2146-8B4A-702AB5487FC4}"/>
+              </a:ext>
+            </a:extLst>
+          </p:cNvPr>
+          <p:cNvSpPr txBox="1"/>
+          <p:nvPr/>
+        </p:nvSpPr>
+        <p:spPr>
+          <a:xfrm>
+            <a:off x="7094360" y="3364380"/>
+            <a:ext cx="982840" cy="157545"/>
+          </a:xfrm>
+          <a:prstGeom prst="rect">
+            <a:avLst/>
+          </a:prstGeom>
+          <a:noFill/>
+        </p:spPr>
+        <p:txBody>
+          <a:bodyPr wrap="square" lIns="0" tIns="0" rIns="0" bIns="0" rtlCol="0">
+            <a:spAutoFit/>
+          </a:bodyPr>
+          <a:lstStyle>
+            <a:defPPr>
+              <a:defRPr lang="en-US"/>
+            </a:defPPr>
+            <a:lvl1pPr algn="r">
+              <a:defRPr sz="1400">
+                <a:solidFill>
+                  <a:srgbClr val="0070C0"/>
+                </a:solidFill>
+              </a:defRPr>
+            </a:lvl1pPr>
+          </a:lstStyle>
+          <a:p>
+            <a:pPr algn="ctr"/>
+            <a:r>
+              <a:rPr lang="en-US" sz="1000" dirty="0" err="1">
+                <a:solidFill>
+                  <a:schemeClr val="accent3">
+                    <a:lumMod val="50000"/>
+                  </a:schemeClr>
+                </a:solidFill>
+              </a:rPr>
+              <a:t>setLeftPanel</a:t>
+            </a:r>
+            <a:r>
+              <a:rPr lang="en-US" sz="1000" dirty="0">
+                <a:solidFill>
+                  <a:schemeClr val="accent3">
+                    <a:lumMod val="50000"/>
+                  </a:schemeClr>
+                </a:solidFill>
+              </a:rPr>
+              <a:t>(</a:t>
+            </a:r>
+            <a:r>
+              <a:rPr lang="en-US" sz="1000" dirty="0" err="1">
+                <a:solidFill>
+                  <a:schemeClr val="accent3">
+                    <a:lumMod val="50000"/>
+                  </a:schemeClr>
+                </a:solidFill>
+              </a:rPr>
+              <a:t>qp</a:t>
+            </a:r>
+            <a:r>
+              <a:rPr lang="en-US" sz="1000" dirty="0">
+                <a:solidFill>
+                  <a:schemeClr val="accent3">
+                    <a:lumMod val="50000"/>
+                  </a:schemeClr>
+                </a:solidFill>
+              </a:rPr>
+              <a:t>)</a:t>
+            </a:r>
+          </a:p>
+        </p:txBody>
+      </p:sp>
+      <p:cxnSp>
+        <p:nvCxnSpPr>
+          <p:cNvPr id="126" name="Straight Arrow Connector 125">
+            <a:extLst>
+              <a:ext uri="{FF2B5EF4-FFF2-40B4-BE49-F238E27FC236}">
+                <a16:creationId xmlns:a16="http://schemas.microsoft.com/office/drawing/2014/main" id="{A16F0E26-C8F5-2A43-B394-DEE377002631}"/>
+              </a:ext>
+            </a:extLst>
+          </p:cNvPr>
+          <p:cNvCxnSpPr>
+            <a:cxnSpLocks/>
+            <a:endCxn id="97" idx="2"/>
+          </p:cNvCxnSpPr>
+          <p:nvPr/>
+        </p:nvCxnSpPr>
+        <p:spPr>
+          <a:xfrm>
+            <a:off x="5542748" y="3657595"/>
+            <a:ext cx="1434306" cy="0"/>
+          </a:xfrm>
+          <a:prstGeom prst="straightConnector1">
+            <a:avLst/>
+          </a:prstGeom>
+          <a:ln w="19050">
+            <a:solidFill>
+              <a:schemeClr val="accent3">
+                <a:lumMod val="50000"/>
+              </a:schemeClr>
             </a:solidFill>
             <a:prstDash val="sysDash"/>
             <a:headEnd type="arrow" w="med" len="med"/>

</xml_diff>